<commit_message>
ICPP: Most of Bruce's last fixes.  Karens' suggestions/fixes. All TODOs completed.
git-svn-id: svn://localhost/subsetter/trunk@97 803cb72c-d64d-0410-ae51-a9422f8e9f96
</commit_message>
<xml_diff>
--- a/papers/2010-ICPP/images/Subset1.pptx
+++ b/papers/2010-ICPP/images/Subset1.pptx
@@ -1,6 +1,6 @@
 
 <file path=ppt/presentation.xml><?xml version="1.0" encoding="utf-8"?>
-<p:presentation xmlns:a="http://schemas.openxmlformats.org/drawingml/2006/main" xmlns:r="http://schemas.openxmlformats.org/officeDocument/2006/relationships" xmlns:p="http://schemas.openxmlformats.org/presentationml/2006/main" saveSubsetFonts="1">
+<p:presentation xmlns:a="http://schemas.openxmlformats.org/drawingml/2006/main" xmlns:r="http://schemas.openxmlformats.org/officeDocument/2006/relationships" xmlns:mc="http://schemas.openxmlformats.org/markup-compatibility/2006" xmlns:mv="urn:schemas-microsoft-com:mac:vml" xmlns:p="http://schemas.openxmlformats.org/presentationml/2006/main" mc:Ignorable="mv" mc:PreserveAttributes="mv:*" saveSubsetFonts="1">
   <p:sldMasterIdLst>
     <p:sldMasterId id="2147483648" r:id="rId1"/>
   </p:sldMasterIdLst>
@@ -138,7 +138,7 @@
 </file>
 
 <file path=ppt/slideLayouts/slideLayout1.xml><?xml version="1.0" encoding="utf-8"?>
-<p:sldLayout xmlns:a="http://schemas.openxmlformats.org/drawingml/2006/main" xmlns:r="http://schemas.openxmlformats.org/officeDocument/2006/relationships" xmlns:p="http://schemas.openxmlformats.org/presentationml/2006/main" type="title" preserve="1">
+<p:sldLayout xmlns:a="http://schemas.openxmlformats.org/drawingml/2006/main" xmlns:r="http://schemas.openxmlformats.org/officeDocument/2006/relationships" xmlns:mc="http://schemas.openxmlformats.org/markup-compatibility/2006" xmlns:mv="urn:schemas-microsoft-com:mac:vml" xmlns:p="http://schemas.openxmlformats.org/presentationml/2006/main" mc:Ignorable="mv" mc:PreserveAttributes="mv:*" type="title" preserve="1">
   <p:cSld name="Title Slide">
     <p:spTree>
       <p:nvGrpSpPr>
@@ -330,7 +330,7 @@
 </file>
 
 <file path=ppt/slideLayouts/slideLayout10.xml><?xml version="1.0" encoding="utf-8"?>
-<p:sldLayout xmlns:a="http://schemas.openxmlformats.org/drawingml/2006/main" xmlns:r="http://schemas.openxmlformats.org/officeDocument/2006/relationships" xmlns:p="http://schemas.openxmlformats.org/presentationml/2006/main" type="vertTx" preserve="1">
+<p:sldLayout xmlns:a="http://schemas.openxmlformats.org/drawingml/2006/main" xmlns:r="http://schemas.openxmlformats.org/officeDocument/2006/relationships" xmlns:mc="http://schemas.openxmlformats.org/markup-compatibility/2006" xmlns:mv="urn:schemas-microsoft-com:mac:vml" xmlns:p="http://schemas.openxmlformats.org/presentationml/2006/main" mc:Ignorable="mv" mc:PreserveAttributes="mv:*" type="vertTx" preserve="1">
   <p:cSld name="Title and Vertical Text">
     <p:spTree>
       <p:nvGrpSpPr>
@@ -504,7 +504,7 @@
 </file>
 
 <file path=ppt/slideLayouts/slideLayout11.xml><?xml version="1.0" encoding="utf-8"?>
-<p:sldLayout xmlns:a="http://schemas.openxmlformats.org/drawingml/2006/main" xmlns:r="http://schemas.openxmlformats.org/officeDocument/2006/relationships" xmlns:p="http://schemas.openxmlformats.org/presentationml/2006/main" type="vertTitleAndTx" preserve="1">
+<p:sldLayout xmlns:a="http://schemas.openxmlformats.org/drawingml/2006/main" xmlns:r="http://schemas.openxmlformats.org/officeDocument/2006/relationships" xmlns:mc="http://schemas.openxmlformats.org/markup-compatibility/2006" xmlns:mv="urn:schemas-microsoft-com:mac:vml" xmlns:p="http://schemas.openxmlformats.org/presentationml/2006/main" mc:Ignorable="mv" mc:PreserveAttributes="mv:*" type="vertTitleAndTx" preserve="1">
   <p:cSld name="Vertical Title and Text">
     <p:spTree>
       <p:nvGrpSpPr>
@@ -688,7 +688,7 @@
 </file>
 
 <file path=ppt/slideLayouts/slideLayout2.xml><?xml version="1.0" encoding="utf-8"?>
-<p:sldLayout xmlns:a="http://schemas.openxmlformats.org/drawingml/2006/main" xmlns:r="http://schemas.openxmlformats.org/officeDocument/2006/relationships" xmlns:p="http://schemas.openxmlformats.org/presentationml/2006/main" type="obj" preserve="1">
+<p:sldLayout xmlns:a="http://schemas.openxmlformats.org/drawingml/2006/main" xmlns:r="http://schemas.openxmlformats.org/officeDocument/2006/relationships" xmlns:mc="http://schemas.openxmlformats.org/markup-compatibility/2006" xmlns:mv="urn:schemas-microsoft-com:mac:vml" xmlns:p="http://schemas.openxmlformats.org/presentationml/2006/main" mc:Ignorable="mv" mc:PreserveAttributes="mv:*" type="obj" preserve="1">
   <p:cSld name="Title and Content">
     <p:spTree>
       <p:nvGrpSpPr>
@@ -862,7 +862,7 @@
 </file>
 
 <file path=ppt/slideLayouts/slideLayout3.xml><?xml version="1.0" encoding="utf-8"?>
-<p:sldLayout xmlns:a="http://schemas.openxmlformats.org/drawingml/2006/main" xmlns:r="http://schemas.openxmlformats.org/officeDocument/2006/relationships" xmlns:p="http://schemas.openxmlformats.org/presentationml/2006/main" type="secHead" preserve="1">
+<p:sldLayout xmlns:a="http://schemas.openxmlformats.org/drawingml/2006/main" xmlns:r="http://schemas.openxmlformats.org/officeDocument/2006/relationships" xmlns:mc="http://schemas.openxmlformats.org/markup-compatibility/2006" xmlns:mv="urn:schemas-microsoft-com:mac:vml" xmlns:p="http://schemas.openxmlformats.org/presentationml/2006/main" mc:Ignorable="mv" mc:PreserveAttributes="mv:*" type="secHead" preserve="1">
   <p:cSld name="Section Header">
     <p:spTree>
       <p:nvGrpSpPr>
@@ -1058,7 +1058,7 @@
 </file>
 
 <file path=ppt/slideLayouts/slideLayout4.xml><?xml version="1.0" encoding="utf-8"?>
-<p:sldLayout xmlns:a="http://schemas.openxmlformats.org/drawingml/2006/main" xmlns:r="http://schemas.openxmlformats.org/officeDocument/2006/relationships" xmlns:p="http://schemas.openxmlformats.org/presentationml/2006/main" type="twoObj" preserve="1">
+<p:sldLayout xmlns:a="http://schemas.openxmlformats.org/drawingml/2006/main" xmlns:r="http://schemas.openxmlformats.org/officeDocument/2006/relationships" xmlns:mc="http://schemas.openxmlformats.org/markup-compatibility/2006" xmlns:mv="urn:schemas-microsoft-com:mac:vml" xmlns:p="http://schemas.openxmlformats.org/presentationml/2006/main" mc:Ignorable="mv" mc:PreserveAttributes="mv:*" type="twoObj" preserve="1">
   <p:cSld name="Two Content">
     <p:spTree>
       <p:nvGrpSpPr>
@@ -1350,7 +1350,7 @@
 </file>
 
 <file path=ppt/slideLayouts/slideLayout5.xml><?xml version="1.0" encoding="utf-8"?>
-<p:sldLayout xmlns:a="http://schemas.openxmlformats.org/drawingml/2006/main" xmlns:r="http://schemas.openxmlformats.org/officeDocument/2006/relationships" xmlns:p="http://schemas.openxmlformats.org/presentationml/2006/main" type="twoTxTwoObj" preserve="1">
+<p:sldLayout xmlns:a="http://schemas.openxmlformats.org/drawingml/2006/main" xmlns:r="http://schemas.openxmlformats.org/officeDocument/2006/relationships" xmlns:mc="http://schemas.openxmlformats.org/markup-compatibility/2006" xmlns:mv="urn:schemas-microsoft-com:mac:vml" xmlns:p="http://schemas.openxmlformats.org/presentationml/2006/main" mc:Ignorable="mv" mc:PreserveAttributes="mv:*" type="twoTxTwoObj" preserve="1">
   <p:cSld name="Comparison">
     <p:spTree>
       <p:nvGrpSpPr>
@@ -1776,7 +1776,7 @@
 </file>
 
 <file path=ppt/slideLayouts/slideLayout6.xml><?xml version="1.0" encoding="utf-8"?>
-<p:sldLayout xmlns:a="http://schemas.openxmlformats.org/drawingml/2006/main" xmlns:r="http://schemas.openxmlformats.org/officeDocument/2006/relationships" xmlns:p="http://schemas.openxmlformats.org/presentationml/2006/main" type="titleOnly" preserve="1">
+<p:sldLayout xmlns:a="http://schemas.openxmlformats.org/drawingml/2006/main" xmlns:r="http://schemas.openxmlformats.org/officeDocument/2006/relationships" xmlns:mc="http://schemas.openxmlformats.org/markup-compatibility/2006" xmlns:mv="urn:schemas-microsoft-com:mac:vml" xmlns:p="http://schemas.openxmlformats.org/presentationml/2006/main" mc:Ignorable="mv" mc:PreserveAttributes="mv:*" type="titleOnly" preserve="1">
   <p:cSld name="Title Only">
     <p:spTree>
       <p:nvGrpSpPr>
@@ -1898,7 +1898,7 @@
 </file>
 
 <file path=ppt/slideLayouts/slideLayout7.xml><?xml version="1.0" encoding="utf-8"?>
-<p:sldLayout xmlns:a="http://schemas.openxmlformats.org/drawingml/2006/main" xmlns:r="http://schemas.openxmlformats.org/officeDocument/2006/relationships" xmlns:p="http://schemas.openxmlformats.org/presentationml/2006/main" type="blank" preserve="1">
+<p:sldLayout xmlns:a="http://schemas.openxmlformats.org/drawingml/2006/main" xmlns:r="http://schemas.openxmlformats.org/officeDocument/2006/relationships" xmlns:mc="http://schemas.openxmlformats.org/markup-compatibility/2006" xmlns:mv="urn:schemas-microsoft-com:mac:vml" xmlns:p="http://schemas.openxmlformats.org/presentationml/2006/main" mc:Ignorable="mv" mc:PreserveAttributes="mv:*" type="blank" preserve="1">
   <p:cSld name="Blank">
     <p:spTree>
       <p:nvGrpSpPr>
@@ -1997,7 +1997,7 @@
 </file>
 
 <file path=ppt/slideLayouts/slideLayout8.xml><?xml version="1.0" encoding="utf-8"?>
-<p:sldLayout xmlns:a="http://schemas.openxmlformats.org/drawingml/2006/main" xmlns:r="http://schemas.openxmlformats.org/officeDocument/2006/relationships" xmlns:p="http://schemas.openxmlformats.org/presentationml/2006/main" type="objTx" preserve="1">
+<p:sldLayout xmlns:a="http://schemas.openxmlformats.org/drawingml/2006/main" xmlns:r="http://schemas.openxmlformats.org/officeDocument/2006/relationships" xmlns:mc="http://schemas.openxmlformats.org/markup-compatibility/2006" xmlns:mv="urn:schemas-microsoft-com:mac:vml" xmlns:p="http://schemas.openxmlformats.org/presentationml/2006/main" mc:Ignorable="mv" mc:PreserveAttributes="mv:*" type="objTx" preserve="1">
   <p:cSld name="Content with Caption">
     <p:spTree>
       <p:nvGrpSpPr>
@@ -2278,7 +2278,7 @@
 </file>
 
 <file path=ppt/slideLayouts/slideLayout9.xml><?xml version="1.0" encoding="utf-8"?>
-<p:sldLayout xmlns:a="http://schemas.openxmlformats.org/drawingml/2006/main" xmlns:r="http://schemas.openxmlformats.org/officeDocument/2006/relationships" xmlns:p="http://schemas.openxmlformats.org/presentationml/2006/main" type="picTx" preserve="1">
+<p:sldLayout xmlns:a="http://schemas.openxmlformats.org/drawingml/2006/main" xmlns:r="http://schemas.openxmlformats.org/officeDocument/2006/relationships" xmlns:mc="http://schemas.openxmlformats.org/markup-compatibility/2006" xmlns:mv="urn:schemas-microsoft-com:mac:vml" xmlns:p="http://schemas.openxmlformats.org/presentationml/2006/main" mc:Ignorable="mv" mc:PreserveAttributes="mv:*" type="picTx" preserve="1">
   <p:cSld name="Picture with Caption">
     <p:spTree>
       <p:nvGrpSpPr>
@@ -2535,7 +2535,7 @@
 </file>
 
 <file path=ppt/slideMasters/slideMaster1.xml><?xml version="1.0" encoding="utf-8"?>
-<p:sldMaster xmlns:a="http://schemas.openxmlformats.org/drawingml/2006/main" xmlns:r="http://schemas.openxmlformats.org/officeDocument/2006/relationships" xmlns:p="http://schemas.openxmlformats.org/presentationml/2006/main">
+<p:sldMaster xmlns:a="http://schemas.openxmlformats.org/drawingml/2006/main" xmlns:r="http://schemas.openxmlformats.org/officeDocument/2006/relationships" xmlns:mc="http://schemas.openxmlformats.org/markup-compatibility/2006" xmlns:mv="urn:schemas-microsoft-com:mac:vml" xmlns:p="http://schemas.openxmlformats.org/presentationml/2006/main" mc:Ignorable="mv" mc:PreserveAttributes="mv:*">
   <p:cSld>
     <p:bg>
       <p:bgPr>
@@ -3193,7 +3193,7 @@
 </file>
 
 <file path=ppt/slides/slide1.xml><?xml version="1.0" encoding="utf-8"?>
-<p:sld xmlns:a="http://schemas.openxmlformats.org/drawingml/2006/main" xmlns:r="http://schemas.openxmlformats.org/officeDocument/2006/relationships" xmlns:p="http://schemas.openxmlformats.org/presentationml/2006/main">
+<p:sld xmlns:a="http://schemas.openxmlformats.org/drawingml/2006/main" xmlns:r="http://schemas.openxmlformats.org/officeDocument/2006/relationships" xmlns:mc="http://schemas.openxmlformats.org/markup-compatibility/2006" xmlns:mv="urn:schemas-microsoft-com:mac:vml" xmlns:p="http://schemas.openxmlformats.org/presentationml/2006/main" mc:Ignorable="mv" mc:PreserveAttributes="mv:*">
   <p:cSld>
     <p:spTree>
       <p:nvGrpSpPr>
@@ -5617,7 +5617,7 @@
         </p:nvSpPr>
         <p:spPr bwMode="auto">
           <a:xfrm>
-            <a:off x="3829050" y="4281488"/>
+            <a:off x="4038600" y="3962400"/>
             <a:ext cx="895350" cy="366712"/>
           </a:xfrm>
           <a:prstGeom prst="rect">
@@ -5639,7 +5639,7 @@
           <a:lstStyle/>
           <a:p>
             <a:r>
-              <a:rPr lang="en-US"/>
+              <a:rPr lang="en-US" dirty="0"/>
               <a:t>Extract</a:t>
             </a:r>
           </a:p>
@@ -5655,7 +5655,7 @@
         </p:nvSpPr>
         <p:spPr bwMode="auto">
           <a:xfrm>
-            <a:off x="5581650" y="4244975"/>
+            <a:off x="5638800" y="3962400"/>
             <a:ext cx="1098550" cy="366713"/>
           </a:xfrm>
           <a:prstGeom prst="rect">

</xml_diff>